<commit_message>
Adiciona resolucao exercicios 1.0 e 1.1 bd
</commit_message>
<xml_diff>
--- a/sprint-1-bd/aulas/Aula_04_BD.pptx
+++ b/sprint-1-bd/aulas/Aula_04_BD.pptx
@@ -5816,6 +5816,36 @@
           </a:p>
         </p:txBody>
       </p:sp>
+      <p:pic>
+        <p:nvPicPr>
+          <p:cNvPr id="7" name="Imagem 6" descr="Diagrama&#10;&#10;Descrição gerada automaticamente">
+            <a:extLst>
+              <a:ext uri="{FF2B5EF4-FFF2-40B4-BE49-F238E27FC236}">
+                <a16:creationId xmlns:a16="http://schemas.microsoft.com/office/drawing/2014/main" id="{AD2B40C4-A7E8-408E-9D72-8C1C8C8C57BE}"/>
+              </a:ext>
+            </a:extLst>
+          </p:cNvPr>
+          <p:cNvPicPr>
+            <a:picLocks noChangeAspect="1"/>
+          </p:cNvPicPr>
+          <p:nvPr/>
+        </p:nvPicPr>
+        <p:blipFill>
+          <a:blip r:embed="rId2"/>
+          <a:stretch>
+            <a:fillRect/>
+          </a:stretch>
+        </p:blipFill>
+        <p:spPr>
+          <a:xfrm>
+            <a:off x="2727209" y="2763469"/>
+            <a:ext cx="3689583" cy="3622500"/>
+          </a:xfrm>
+          <a:prstGeom prst="rect">
+            <a:avLst/>
+          </a:prstGeom>
+        </p:spPr>
+      </p:pic>
     </p:spTree>
     <p:extLst>
       <p:ext uri="{BB962C8B-B14F-4D97-AF65-F5344CB8AC3E}">
@@ -6937,6 +6967,12 @@
 </file>
 
 <file path=customXml/item2.xml><?xml version="1.0" encoding="utf-8"?>
+<p:properties xmlns:p="http://schemas.microsoft.com/office/2006/metadata/properties" xmlns:xsi="http://www.w3.org/2001/XMLSchema-instance" xmlns:pc="http://schemas.microsoft.com/office/infopath/2007/PartnerControls">
+  <documentManagement/>
+</p:properties>
+</file>
+
+<file path=customXml/item3.xml><?xml version="1.0" encoding="utf-8"?>
 <ct:contentTypeSchema xmlns:ct="http://schemas.microsoft.com/office/2006/metadata/contentType" xmlns:ma="http://schemas.microsoft.com/office/2006/metadata/properties/metaAttributes" ct:_="" ma:_="" ma:contentTypeName="Documento" ma:contentTypeID="0x0101001C0BDCB75C490F449996D271113E7085" ma:contentTypeVersion="12" ma:contentTypeDescription="Crie um novo documento." ma:contentTypeScope="" ma:versionID="f78031fe7deaa61be8293be56c3571d3">
   <xsd:schema xmlns:xsd="http://www.w3.org/2001/XMLSchema" xmlns:xs="http://www.w3.org/2001/XMLSchema" xmlns:p="http://schemas.microsoft.com/office/2006/metadata/properties" xmlns:ns2="56135199-fddc-46f9-8522-4d2f2df906d6" xmlns:ns3="616ddcb6-37a4-4b68-9e62-eadd2126515b" targetNamespace="http://schemas.microsoft.com/office/2006/metadata/properties" ma:root="true" ma:fieldsID="84b82f449ed318020166b0b852c53661" ns2:_="" ns3:_="">
     <xsd:import namespace="56135199-fddc-46f9-8522-4d2f2df906d6"/>
@@ -7153,12 +7189,6 @@
 </ct:contentTypeSchema>
 </file>
 
-<file path=customXml/item3.xml><?xml version="1.0" encoding="utf-8"?>
-<p:properties xmlns:p="http://schemas.microsoft.com/office/2006/metadata/properties" xmlns:xsi="http://www.w3.org/2001/XMLSchema-instance" xmlns:pc="http://schemas.microsoft.com/office/infopath/2007/PartnerControls">
-  <documentManagement/>
-</p:properties>
-</file>
-
 <file path=customXml/itemProps1.xml><?xml version="1.0" encoding="utf-8"?>
 <ds:datastoreItem xmlns:ds="http://schemas.openxmlformats.org/officeDocument/2006/customXml" ds:itemID="{8AEFDE86-9ABD-4B53-9EB0-611E0710241D}">
   <ds:schemaRefs>
@@ -7168,6 +7198,15 @@
 </file>
 
 <file path=customXml/itemProps2.xml><?xml version="1.0" encoding="utf-8"?>
+<ds:datastoreItem xmlns:ds="http://schemas.openxmlformats.org/officeDocument/2006/customXml" ds:itemID="{7598036D-8F24-4150-8883-4040B39D685E}">
+  <ds:schemaRefs>
+    <ds:schemaRef ds:uri="http://schemas.microsoft.com/office/2006/metadata/properties"/>
+    <ds:schemaRef ds:uri="http://schemas.microsoft.com/office/infopath/2007/PartnerControls"/>
+  </ds:schemaRefs>
+</ds:datastoreItem>
+</file>
+
+<file path=customXml/itemProps3.xml><?xml version="1.0" encoding="utf-8"?>
 <ds:datastoreItem xmlns:ds="http://schemas.openxmlformats.org/officeDocument/2006/customXml" ds:itemID="{DD46F767-487D-45A7-9383-4F9F29521278}">
   <ds:schemaRefs>
     <ds:schemaRef ds:uri="http://schemas.microsoft.com/office/2006/metadata/contentType"/>
@@ -7184,13 +7223,4 @@
     <ds:schemaRef ds:uri="http://schemas.microsoft.com/internal/obd"/>
   </ds:schemaRefs>
 </ds:datastoreItem>
-</file>
-
-<file path=customXml/itemProps3.xml><?xml version="1.0" encoding="utf-8"?>
-<ds:datastoreItem xmlns:ds="http://schemas.openxmlformats.org/officeDocument/2006/customXml" ds:itemID="{7598036D-8F24-4150-8883-4040B39D685E}">
-  <ds:schemaRefs>
-    <ds:schemaRef ds:uri="http://schemas.microsoft.com/office/2006/metadata/properties"/>
-    <ds:schemaRef ds:uri="http://schemas.microsoft.com/office/infopath/2007/PartnerControls"/>
-  </ds:schemaRefs>
-</ds:datastoreItem>
 </file>
</xml_diff>